<commit_message>
update document ID numbers
</commit_message>
<xml_diff>
--- a/doc/sqa/LOGOS_SQA_Status_Dashboard.pptx
+++ b/doc/sqa/LOGOS_SQA_Status_Dashboard.pptx
@@ -302,7 +302,7 @@
           <a:p>
             <a:fld id="{E6D1C339-CAC1-4443-897F-22558BB31AC2}" type="datetimeFigureOut">
               <a:rPr lang="en-US" smtClean="0"/>
-              <a:t>11/30/20</a:t>
+              <a:t>1/12/21</a:t>
             </a:fld>
             <a:endParaRPr lang="en-US" dirty="0"/>
           </a:p>
@@ -470,7 +470,7 @@
           <a:p>
             <a:fld id="{E6D1C339-CAC1-4443-897F-22558BB31AC2}" type="datetimeFigureOut">
               <a:rPr lang="en-US" smtClean="0"/>
-              <a:t>11/30/20</a:t>
+              <a:t>1/12/21</a:t>
             </a:fld>
             <a:endParaRPr lang="en-US" dirty="0"/>
           </a:p>
@@ -648,7 +648,7 @@
           <a:p>
             <a:fld id="{E6D1C339-CAC1-4443-897F-22558BB31AC2}" type="datetimeFigureOut">
               <a:rPr lang="en-US" smtClean="0"/>
-              <a:t>11/30/20</a:t>
+              <a:t>1/12/21</a:t>
             </a:fld>
             <a:endParaRPr lang="en-US" dirty="0"/>
           </a:p>
@@ -816,7 +816,7 @@
           <a:p>
             <a:fld id="{E6D1C339-CAC1-4443-897F-22558BB31AC2}" type="datetimeFigureOut">
               <a:rPr lang="en-US" smtClean="0"/>
-              <a:t>11/30/20</a:t>
+              <a:t>1/12/21</a:t>
             </a:fld>
             <a:endParaRPr lang="en-US" dirty="0"/>
           </a:p>
@@ -1061,7 +1061,7 @@
           <a:p>
             <a:fld id="{E6D1C339-CAC1-4443-897F-22558BB31AC2}" type="datetimeFigureOut">
               <a:rPr lang="en-US" smtClean="0"/>
-              <a:t>11/30/20</a:t>
+              <a:t>1/12/21</a:t>
             </a:fld>
             <a:endParaRPr lang="en-US" dirty="0"/>
           </a:p>
@@ -1346,7 +1346,7 @@
           <a:p>
             <a:fld id="{E6D1C339-CAC1-4443-897F-22558BB31AC2}" type="datetimeFigureOut">
               <a:rPr lang="en-US" smtClean="0"/>
-              <a:t>11/30/20</a:t>
+              <a:t>1/12/21</a:t>
             </a:fld>
             <a:endParaRPr lang="en-US" dirty="0"/>
           </a:p>
@@ -1765,7 +1765,7 @@
           <a:p>
             <a:fld id="{E6D1C339-CAC1-4443-897F-22558BB31AC2}" type="datetimeFigureOut">
               <a:rPr lang="en-US" smtClean="0"/>
-              <a:t>11/30/20</a:t>
+              <a:t>1/12/21</a:t>
             </a:fld>
             <a:endParaRPr lang="en-US" dirty="0"/>
           </a:p>
@@ -1882,7 +1882,7 @@
           <a:p>
             <a:fld id="{E6D1C339-CAC1-4443-897F-22558BB31AC2}" type="datetimeFigureOut">
               <a:rPr lang="en-US" smtClean="0"/>
-              <a:t>11/30/20</a:t>
+              <a:t>1/12/21</a:t>
             </a:fld>
             <a:endParaRPr lang="en-US" dirty="0"/>
           </a:p>
@@ -1977,7 +1977,7 @@
           <a:p>
             <a:fld id="{E6D1C339-CAC1-4443-897F-22558BB31AC2}" type="datetimeFigureOut">
               <a:rPr lang="en-US" smtClean="0"/>
-              <a:t>11/30/20</a:t>
+              <a:t>1/12/21</a:t>
             </a:fld>
             <a:endParaRPr lang="en-US" dirty="0"/>
           </a:p>
@@ -2252,7 +2252,7 @@
           <a:p>
             <a:fld id="{E6D1C339-CAC1-4443-897F-22558BB31AC2}" type="datetimeFigureOut">
               <a:rPr lang="en-US" smtClean="0"/>
-              <a:t>11/30/20</a:t>
+              <a:t>1/12/21</a:t>
             </a:fld>
             <a:endParaRPr lang="en-US" dirty="0"/>
           </a:p>
@@ -2504,7 +2504,7 @@
           <a:p>
             <a:fld id="{E6D1C339-CAC1-4443-897F-22558BB31AC2}" type="datetimeFigureOut">
               <a:rPr lang="en-US" smtClean="0"/>
-              <a:t>11/30/20</a:t>
+              <a:t>1/12/21</a:t>
             </a:fld>
             <a:endParaRPr lang="en-US" dirty="0"/>
           </a:p>
@@ -2715,7 +2715,7 @@
           <a:p>
             <a:fld id="{E6D1C339-CAC1-4443-897F-22558BB31AC2}" type="datetimeFigureOut">
               <a:rPr lang="en-US" smtClean="0"/>
-              <a:t>11/30/20</a:t>
+              <a:t>1/12/21</a:t>
             </a:fld>
             <a:endParaRPr lang="en-US" dirty="0"/>
           </a:p>
@@ -4565,15 +4565,7 @@
                   <a:schemeClr val="bg1"/>
                 </a:solidFill>
               </a:rPr>
-              <a:t>SPC-</a:t>
-            </a:r>
-            <a:r>
-              <a:rPr lang="en-US" sz="900" b="1" dirty="0" err="1">
-                <a:solidFill>
-                  <a:schemeClr val="bg1"/>
-                </a:solidFill>
-              </a:rPr>
-              <a:t>xxxx</a:t>
+              <a:t>SPC-2979</a:t>
             </a:r>
             <a:endParaRPr lang="en-US" sz="900" dirty="0">
               <a:solidFill>
@@ -4799,7 +4791,7 @@
                   <a:schemeClr val="bg1"/>
                 </a:solidFill>
               </a:rPr>
-              <a:t>SDD-xxx</a:t>
+              <a:t>SDD-559</a:t>
             </a:r>
           </a:p>
         </p:txBody>
@@ -5543,23 +5535,7 @@
                   <a:schemeClr val="bg1"/>
                 </a:solidFill>
               </a:rPr>
-              <a:t>INL/EXT-xx-</a:t>
-            </a:r>
-            <a:r>
-              <a:rPr lang="en-US" sz="900" b="1" dirty="0" err="1">
-                <a:solidFill>
-                  <a:schemeClr val="bg1"/>
-                </a:solidFill>
-              </a:rPr>
-              <a:t>xxxxx</a:t>
-            </a:r>
-            <a:r>
-              <a:rPr lang="en-US" sz="900" b="1" dirty="0">
-                <a:solidFill>
-                  <a:schemeClr val="bg1"/>
-                </a:solidFill>
-              </a:rPr>
-              <a:t> </a:t>
+              <a:t>INL/EXT-20-61001</a:t>
             </a:r>
           </a:p>
         </p:txBody>
@@ -6709,21 +6685,8 @@
                   <a:schemeClr val="bg1"/>
                 </a:solidFill>
               </a:rPr>
-              <a:t>SPC-</a:t>
-            </a:r>
-            <a:r>
-              <a:rPr lang="en-US" sz="900" b="1" dirty="0" err="1">
-                <a:solidFill>
-                  <a:schemeClr val="bg1"/>
-                </a:solidFill>
-              </a:rPr>
-              <a:t>xxxx</a:t>
-            </a:r>
-            <a:endParaRPr lang="en-US" sz="900" b="1" dirty="0">
-              <a:solidFill>
-                <a:schemeClr val="bg1"/>
-              </a:solidFill>
-            </a:endParaRPr>
+              <a:t>SPC-2979</a:t>
+            </a:r>
           </a:p>
           <a:p>
             <a:pPr algn="ctr"/>
@@ -7159,21 +7122,8 @@
                   <a:schemeClr val="bg1"/>
                 </a:solidFill>
               </a:rPr>
-              <a:t>LST-</a:t>
-            </a:r>
-            <a:r>
-              <a:rPr lang="en-US" sz="900" b="1" dirty="0" err="1">
-                <a:solidFill>
-                  <a:schemeClr val="bg1"/>
-                </a:solidFill>
-              </a:rPr>
-              <a:t>xxxx</a:t>
-            </a:r>
-            <a:endParaRPr lang="en-US" sz="900" b="1" dirty="0">
-              <a:solidFill>
-                <a:schemeClr val="bg1"/>
-              </a:solidFill>
-            </a:endParaRPr>
+              <a:t>LST-1291</a:t>
+            </a:r>
           </a:p>
         </p:txBody>
       </p:sp>

</xml_diff>